<commit_message>
Committed and reviewed 2 presentations
</commit_message>
<xml_diff>
--- a/papers/cs598dm-presentation-WHYPER Towards Automating Risk Assessment of Mobile Applications.pdf.pptx
+++ b/papers/cs598dm-presentation-WHYPER Towards Automating Risk Assessment of Mobile Applications.pdf.pptx
@@ -6229,7 +6229,7 @@
           <a:p>
             <a:r>
               <a:rPr lang="en-US" dirty="0"/>
-              <a:t>App Markets Security Challenge</a:t>
+              <a:t>Mobile Application Security Challenge</a:t>
             </a:r>
           </a:p>
           <a:p>
@@ -7981,7 +7981,7 @@
           <a:p>
             <a:r>
               <a:rPr lang="en-US" dirty="0"/>
-              <a:t>Semantic Inference</a:t>
+              <a:t>Lack of Semantic Inference</a:t>
             </a:r>
           </a:p>
           <a:p>

</xml_diff>